<commit_message>
Added circuit diagram and vero layout
</commit_message>
<xml_diff>
--- a/power_control/State_diagram.pptx
+++ b/power_control/State_diagram.pptx
@@ -115,7 +115,7 @@
 <file path=ppt/revisionInfo.xml><?xml version="1.0" encoding="utf-8"?>
 <p1510:revInfo xmlns:a="http://schemas.openxmlformats.org/drawingml/2006/main" xmlns:r="http://schemas.openxmlformats.org/officeDocument/2006/relationships" xmlns:p1510="http://schemas.microsoft.com/office/powerpoint/2015/10/main">
   <p1510:revLst>
-    <p1510:client id="{8AF0FD5F-2876-4877-BEA8-E212F969C278}" v="510" dt="2025-11-03T17:42:21.923"/>
+    <p1510:client id="{ADFDB23E-21D4-4120-9093-F0F8DC9FA615}" v="54" dt="2025-11-07T09:08:04.189"/>
   </p1510:revLst>
 </p1510:revInfo>
 </file>
@@ -251,7 +251,7 @@
           <a:p>
             <a:fld id="{846CE7D5-CF57-46EF-B807-FDD0502418D4}" type="datetimeFigureOut">
               <a:rPr lang="en-GB" smtClean="0"/>
-              <a:t>03/11/2025</a:t>
+              <a:t>07/11/2025</a:t>
             </a:fld>
             <a:endParaRPr lang="en-GB"/>
           </a:p>
@@ -421,7 +421,7 @@
           <a:p>
             <a:fld id="{846CE7D5-CF57-46EF-B807-FDD0502418D4}" type="datetimeFigureOut">
               <a:rPr lang="en-GB" smtClean="0"/>
-              <a:t>03/11/2025</a:t>
+              <a:t>07/11/2025</a:t>
             </a:fld>
             <a:endParaRPr lang="en-GB"/>
           </a:p>
@@ -601,7 +601,7 @@
           <a:p>
             <a:fld id="{846CE7D5-CF57-46EF-B807-FDD0502418D4}" type="datetimeFigureOut">
               <a:rPr lang="en-GB" smtClean="0"/>
-              <a:t>03/11/2025</a:t>
+              <a:t>07/11/2025</a:t>
             </a:fld>
             <a:endParaRPr lang="en-GB"/>
           </a:p>
@@ -771,7 +771,7 @@
           <a:p>
             <a:fld id="{846CE7D5-CF57-46EF-B807-FDD0502418D4}" type="datetimeFigureOut">
               <a:rPr lang="en-GB" smtClean="0"/>
-              <a:t>03/11/2025</a:t>
+              <a:t>07/11/2025</a:t>
             </a:fld>
             <a:endParaRPr lang="en-GB"/>
           </a:p>
@@ -1017,7 +1017,7 @@
           <a:p>
             <a:fld id="{846CE7D5-CF57-46EF-B807-FDD0502418D4}" type="datetimeFigureOut">
               <a:rPr lang="en-GB" smtClean="0"/>
-              <a:t>03/11/2025</a:t>
+              <a:t>07/11/2025</a:t>
             </a:fld>
             <a:endParaRPr lang="en-GB"/>
           </a:p>
@@ -1249,7 +1249,7 @@
           <a:p>
             <a:fld id="{846CE7D5-CF57-46EF-B807-FDD0502418D4}" type="datetimeFigureOut">
               <a:rPr lang="en-GB" smtClean="0"/>
-              <a:t>03/11/2025</a:t>
+              <a:t>07/11/2025</a:t>
             </a:fld>
             <a:endParaRPr lang="en-GB"/>
           </a:p>
@@ -1616,7 +1616,7 @@
           <a:p>
             <a:fld id="{846CE7D5-CF57-46EF-B807-FDD0502418D4}" type="datetimeFigureOut">
               <a:rPr lang="en-GB" smtClean="0"/>
-              <a:t>03/11/2025</a:t>
+              <a:t>07/11/2025</a:t>
             </a:fld>
             <a:endParaRPr lang="en-GB"/>
           </a:p>
@@ -1734,7 +1734,7 @@
           <a:p>
             <a:fld id="{846CE7D5-CF57-46EF-B807-FDD0502418D4}" type="datetimeFigureOut">
               <a:rPr lang="en-GB" smtClean="0"/>
-              <a:t>03/11/2025</a:t>
+              <a:t>07/11/2025</a:t>
             </a:fld>
             <a:endParaRPr lang="en-GB"/>
           </a:p>
@@ -1829,7 +1829,7 @@
           <a:p>
             <a:fld id="{846CE7D5-CF57-46EF-B807-FDD0502418D4}" type="datetimeFigureOut">
               <a:rPr lang="en-GB" smtClean="0"/>
-              <a:t>03/11/2025</a:t>
+              <a:t>07/11/2025</a:t>
             </a:fld>
             <a:endParaRPr lang="en-GB"/>
           </a:p>
@@ -2106,7 +2106,7 @@
           <a:p>
             <a:fld id="{846CE7D5-CF57-46EF-B807-FDD0502418D4}" type="datetimeFigureOut">
               <a:rPr lang="en-GB" smtClean="0"/>
-              <a:t>03/11/2025</a:t>
+              <a:t>07/11/2025</a:t>
             </a:fld>
             <a:endParaRPr lang="en-GB"/>
           </a:p>
@@ -2363,7 +2363,7 @@
           <a:p>
             <a:fld id="{846CE7D5-CF57-46EF-B807-FDD0502418D4}" type="datetimeFigureOut">
               <a:rPr lang="en-GB" smtClean="0"/>
-              <a:t>03/11/2025</a:t>
+              <a:t>07/11/2025</a:t>
             </a:fld>
             <a:endParaRPr lang="en-GB"/>
           </a:p>
@@ -2576,7 +2576,7 @@
           <a:p>
             <a:fld id="{846CE7D5-CF57-46EF-B807-FDD0502418D4}" type="datetimeFigureOut">
               <a:rPr lang="en-GB" smtClean="0"/>
-              <a:t>03/11/2025</a:t>
+              <a:t>07/11/2025</a:t>
             </a:fld>
             <a:endParaRPr lang="en-GB"/>
           </a:p>
@@ -3503,7 +3503,7 @@
           <a:p>
             <a:r>
               <a:rPr lang="en-GB" sz="1100" dirty="0"/>
-              <a:t>VSENSE_IN = H</a:t>
+              <a:t>VSENSE_IN = L</a:t>
             </a:r>
           </a:p>
         </p:txBody>
@@ -3541,7 +3541,7 @@
           <a:p>
             <a:r>
               <a:rPr lang="en-GB" sz="1100" dirty="0"/>
-              <a:t>VSENSE_IN = L</a:t>
+              <a:t>VSENSE_IN = H</a:t>
             </a:r>
           </a:p>
         </p:txBody>
@@ -3579,7 +3579,7 @@
           <a:p>
             <a:r>
               <a:rPr lang="en-GB" sz="1100" dirty="0"/>
-              <a:t>VSENSE_IN = H</a:t>
+              <a:t>VSENSE_IN = L</a:t>
             </a:r>
           </a:p>
         </p:txBody>
@@ -3617,7 +3617,7 @@
           <a:p>
             <a:r>
               <a:rPr lang="en-GB" sz="1100" dirty="0"/>
-              <a:t>VSENSE_IN = L</a:t>
+              <a:t>VSENSE_IN = H</a:t>
             </a:r>
           </a:p>
         </p:txBody>
@@ -3693,7 +3693,7 @@
           <a:p>
             <a:r>
               <a:rPr lang="en-GB" sz="1100" dirty="0"/>
-              <a:t>120s delay</a:t>
+              <a:t>300s delay</a:t>
             </a:r>
           </a:p>
         </p:txBody>
@@ -3861,7 +3861,7 @@
           <a:p>
             <a:r>
               <a:rPr lang="en-GB" sz="1100" dirty="0"/>
-              <a:t>LED = YELLOW</a:t>
+              <a:t>LED = BLUE</a:t>
             </a:r>
           </a:p>
         </p:txBody>
@@ -4197,7 +4197,7 @@
           <a:p>
             <a:r>
               <a:rPr lang="en-GB" sz="1100" dirty="0"/>
-              <a:t>LED = YELLOW</a:t>
+              <a:t>LED = ORANGE</a:t>
             </a:r>
           </a:p>
         </p:txBody>
@@ -4411,7 +4411,7 @@
           <a:p>
             <a:r>
               <a:rPr lang="en-GB" sz="1100" dirty="0"/>
-              <a:t>PICONTROL_OUT = L</a:t>
+              <a:t>PICONTROL_OUT = H</a:t>
             </a:r>
           </a:p>
         </p:txBody>
@@ -4448,8 +4448,8 @@
           <a:lstStyle/>
           <a:p>
             <a:r>
-              <a:rPr lang="en-GB" sz="1100"/>
-              <a:t>PICONTROL_OUT = H</a:t>
+              <a:rPr lang="en-GB" sz="1100" dirty="0"/>
+              <a:t>PICONTROL_OUT = L</a:t>
             </a:r>
           </a:p>
         </p:txBody>

</xml_diff>

<commit_message>
Added time deadband on TV off state
</commit_message>
<xml_diff>
--- a/power_control/State_diagram.pptx
+++ b/power_control/State_diagram.pptx
@@ -115,7 +115,7 @@
 <file path=ppt/revisionInfo.xml><?xml version="1.0" encoding="utf-8"?>
 <p1510:revInfo xmlns:a="http://schemas.openxmlformats.org/drawingml/2006/main" xmlns:r="http://schemas.openxmlformats.org/officeDocument/2006/relationships" xmlns:p1510="http://schemas.microsoft.com/office/powerpoint/2015/10/main">
   <p1510:revLst>
-    <p1510:client id="{ADFDB23E-21D4-4120-9093-F0F8DC9FA615}" v="54" dt="2025-11-07T09:08:04.189"/>
+    <p1510:client id="{E1E4C3D6-8CB9-4E76-86C1-3C6806EE6BA9}" v="59" dt="2025-11-12T08:55:23.422"/>
   </p1510:revLst>
 </p1510:revInfo>
 </file>
@@ -251,7 +251,7 @@
           <a:p>
             <a:fld id="{846CE7D5-CF57-46EF-B807-FDD0502418D4}" type="datetimeFigureOut">
               <a:rPr lang="en-GB" smtClean="0"/>
-              <a:t>07/11/2025</a:t>
+              <a:t>12/11/2025</a:t>
             </a:fld>
             <a:endParaRPr lang="en-GB"/>
           </a:p>
@@ -421,7 +421,7 @@
           <a:p>
             <a:fld id="{846CE7D5-CF57-46EF-B807-FDD0502418D4}" type="datetimeFigureOut">
               <a:rPr lang="en-GB" smtClean="0"/>
-              <a:t>07/11/2025</a:t>
+              <a:t>12/11/2025</a:t>
             </a:fld>
             <a:endParaRPr lang="en-GB"/>
           </a:p>
@@ -601,7 +601,7 @@
           <a:p>
             <a:fld id="{846CE7D5-CF57-46EF-B807-FDD0502418D4}" type="datetimeFigureOut">
               <a:rPr lang="en-GB" smtClean="0"/>
-              <a:t>07/11/2025</a:t>
+              <a:t>12/11/2025</a:t>
             </a:fld>
             <a:endParaRPr lang="en-GB"/>
           </a:p>
@@ -771,7 +771,7 @@
           <a:p>
             <a:fld id="{846CE7D5-CF57-46EF-B807-FDD0502418D4}" type="datetimeFigureOut">
               <a:rPr lang="en-GB" smtClean="0"/>
-              <a:t>07/11/2025</a:t>
+              <a:t>12/11/2025</a:t>
             </a:fld>
             <a:endParaRPr lang="en-GB"/>
           </a:p>
@@ -1017,7 +1017,7 @@
           <a:p>
             <a:fld id="{846CE7D5-CF57-46EF-B807-FDD0502418D4}" type="datetimeFigureOut">
               <a:rPr lang="en-GB" smtClean="0"/>
-              <a:t>07/11/2025</a:t>
+              <a:t>12/11/2025</a:t>
             </a:fld>
             <a:endParaRPr lang="en-GB"/>
           </a:p>
@@ -1249,7 +1249,7 @@
           <a:p>
             <a:fld id="{846CE7D5-CF57-46EF-B807-FDD0502418D4}" type="datetimeFigureOut">
               <a:rPr lang="en-GB" smtClean="0"/>
-              <a:t>07/11/2025</a:t>
+              <a:t>12/11/2025</a:t>
             </a:fld>
             <a:endParaRPr lang="en-GB"/>
           </a:p>
@@ -1616,7 +1616,7 @@
           <a:p>
             <a:fld id="{846CE7D5-CF57-46EF-B807-FDD0502418D4}" type="datetimeFigureOut">
               <a:rPr lang="en-GB" smtClean="0"/>
-              <a:t>07/11/2025</a:t>
+              <a:t>12/11/2025</a:t>
             </a:fld>
             <a:endParaRPr lang="en-GB"/>
           </a:p>
@@ -1734,7 +1734,7 @@
           <a:p>
             <a:fld id="{846CE7D5-CF57-46EF-B807-FDD0502418D4}" type="datetimeFigureOut">
               <a:rPr lang="en-GB" smtClean="0"/>
-              <a:t>07/11/2025</a:t>
+              <a:t>12/11/2025</a:t>
             </a:fld>
             <a:endParaRPr lang="en-GB"/>
           </a:p>
@@ -1829,7 +1829,7 @@
           <a:p>
             <a:fld id="{846CE7D5-CF57-46EF-B807-FDD0502418D4}" type="datetimeFigureOut">
               <a:rPr lang="en-GB" smtClean="0"/>
-              <a:t>07/11/2025</a:t>
+              <a:t>12/11/2025</a:t>
             </a:fld>
             <a:endParaRPr lang="en-GB"/>
           </a:p>
@@ -2106,7 +2106,7 @@
           <a:p>
             <a:fld id="{846CE7D5-CF57-46EF-B807-FDD0502418D4}" type="datetimeFigureOut">
               <a:rPr lang="en-GB" smtClean="0"/>
-              <a:t>07/11/2025</a:t>
+              <a:t>12/11/2025</a:t>
             </a:fld>
             <a:endParaRPr lang="en-GB"/>
           </a:p>
@@ -2363,7 +2363,7 @@
           <a:p>
             <a:fld id="{846CE7D5-CF57-46EF-B807-FDD0502418D4}" type="datetimeFigureOut">
               <a:rPr lang="en-GB" smtClean="0"/>
-              <a:t>07/11/2025</a:t>
+              <a:t>12/11/2025</a:t>
             </a:fld>
             <a:endParaRPr lang="en-GB"/>
           </a:p>
@@ -2576,7 +2576,7 @@
           <a:p>
             <a:fld id="{846CE7D5-CF57-46EF-B807-FDD0502418D4}" type="datetimeFigureOut">
               <a:rPr lang="en-GB" smtClean="0"/>
-              <a:t>07/11/2025</a:t>
+              <a:t>12/11/2025</a:t>
             </a:fld>
             <a:endParaRPr lang="en-GB"/>
           </a:p>
@@ -3598,8 +3598,8 @@
         </p:nvSpPr>
         <p:spPr>
           <a:xfrm>
-            <a:off x="4654786" y="2821421"/>
-            <a:ext cx="1179094" cy="261610"/>
+            <a:off x="4642496" y="2821421"/>
+            <a:ext cx="2002545" cy="430887"/>
           </a:xfrm>
           <a:prstGeom prst="rect">
             <a:avLst/>
@@ -3618,6 +3618,12 @@
             <a:r>
               <a:rPr lang="en-GB" sz="1100" dirty="0"/>
               <a:t>VSENSE_IN = H</a:t>
+            </a:r>
+          </a:p>
+          <a:p>
+            <a:r>
+              <a:rPr lang="en-GB" sz="1100" dirty="0"/>
+              <a:t>(After 30 secs deadband)</a:t>
             </a:r>
           </a:p>
         </p:txBody>

</xml_diff>